<commit_message>
adds new festival date
</commit_message>
<xml_diff>
--- a/images/events/2019-04-festival/templates.pptx
+++ b/images/events/2019-04-festival/templates.pptx
@@ -6,7 +6,8 @@
   </p:sldMasterIdLst>
   <p:sldIdLst>
     <p:sldId id="256" r:id="rId2"/>
-    <p:sldId id="257" r:id="rId3"/>
+    <p:sldId id="258" r:id="rId3"/>
+    <p:sldId id="257" r:id="rId4"/>
   </p:sldIdLst>
   <p:sldSz cx="12192000" cy="6858000"/>
   <p:notesSz cx="6858000" cy="9144000"/>
@@ -113,6 +114,18 @@
 </p:presentation>
 </file>
 
+<file path=ppt/commentAuthors.xml><?xml version="1.0" encoding="utf-8"?>
+<p:cmAuthorLst xmlns:a="http://schemas.openxmlformats.org/drawingml/2006/main" xmlns:r="http://schemas.openxmlformats.org/officeDocument/2006/relationships" xmlns:p="http://schemas.openxmlformats.org/presentationml/2006/main">
+  <p:cmAuthor id="1" name="Jan Knappe" initials="JK" lastIdx="1" clrIdx="0">
+    <p:extLst>
+      <p:ext uri="{19B8F6BF-5375-455C-9EA6-DF929625EA0E}">
+        <p15:presenceInfo xmlns:p15="http://schemas.microsoft.com/office/powerpoint/2012/main" userId="Jan Knappe" providerId="None"/>
+      </p:ext>
+    </p:extLst>
+  </p:cmAuthor>
+</p:cmAuthorLst>
+</file>
+
 <file path=ppt/slideLayouts/slideLayout1.xml><?xml version="1.0" encoding="utf-8"?>
 <p:sldLayout xmlns:a="http://schemas.openxmlformats.org/drawingml/2006/main" xmlns:r="http://schemas.openxmlformats.org/officeDocument/2006/relationships" xmlns:p="http://schemas.openxmlformats.org/presentationml/2006/main" type="title" preserve="1">
   <p:cSld name="Title Slide">
@@ -262,7 +275,7 @@
           <a:p>
             <a:fld id="{6ADAF93B-E815-47CD-A333-40DA8D7FC746}" type="datetimeFigureOut">
               <a:rPr lang="en-IE" smtClean="0"/>
-              <a:t>17/01/2019</a:t>
+              <a:t>10/02/2019</a:t>
             </a:fld>
             <a:endParaRPr lang="en-IE"/>
           </a:p>
@@ -462,7 +475,7 @@
           <a:p>
             <a:fld id="{6ADAF93B-E815-47CD-A333-40DA8D7FC746}" type="datetimeFigureOut">
               <a:rPr lang="en-IE" smtClean="0"/>
-              <a:t>17/01/2019</a:t>
+              <a:t>10/02/2019</a:t>
             </a:fld>
             <a:endParaRPr lang="en-IE"/>
           </a:p>
@@ -672,7 +685,7 @@
           <a:p>
             <a:fld id="{6ADAF93B-E815-47CD-A333-40DA8D7FC746}" type="datetimeFigureOut">
               <a:rPr lang="en-IE" smtClean="0"/>
-              <a:t>17/01/2019</a:t>
+              <a:t>10/02/2019</a:t>
             </a:fld>
             <a:endParaRPr lang="en-IE"/>
           </a:p>
@@ -872,7 +885,7 @@
           <a:p>
             <a:fld id="{6ADAF93B-E815-47CD-A333-40DA8D7FC746}" type="datetimeFigureOut">
               <a:rPr lang="en-IE" smtClean="0"/>
-              <a:t>17/01/2019</a:t>
+              <a:t>10/02/2019</a:t>
             </a:fld>
             <a:endParaRPr lang="en-IE"/>
           </a:p>
@@ -1148,7 +1161,7 @@
           <a:p>
             <a:fld id="{6ADAF93B-E815-47CD-A333-40DA8D7FC746}" type="datetimeFigureOut">
               <a:rPr lang="en-IE" smtClean="0"/>
-              <a:t>17/01/2019</a:t>
+              <a:t>10/02/2019</a:t>
             </a:fld>
             <a:endParaRPr lang="en-IE"/>
           </a:p>
@@ -1416,7 +1429,7 @@
           <a:p>
             <a:fld id="{6ADAF93B-E815-47CD-A333-40DA8D7FC746}" type="datetimeFigureOut">
               <a:rPr lang="en-IE" smtClean="0"/>
-              <a:t>17/01/2019</a:t>
+              <a:t>10/02/2019</a:t>
             </a:fld>
             <a:endParaRPr lang="en-IE"/>
           </a:p>
@@ -1831,7 +1844,7 @@
           <a:p>
             <a:fld id="{6ADAF93B-E815-47CD-A333-40DA8D7FC746}" type="datetimeFigureOut">
               <a:rPr lang="en-IE" smtClean="0"/>
-              <a:t>17/01/2019</a:t>
+              <a:t>10/02/2019</a:t>
             </a:fld>
             <a:endParaRPr lang="en-IE"/>
           </a:p>
@@ -1973,7 +1986,7 @@
           <a:p>
             <a:fld id="{6ADAF93B-E815-47CD-A333-40DA8D7FC746}" type="datetimeFigureOut">
               <a:rPr lang="en-IE" smtClean="0"/>
-              <a:t>17/01/2019</a:t>
+              <a:t>10/02/2019</a:t>
             </a:fld>
             <a:endParaRPr lang="en-IE"/>
           </a:p>
@@ -2086,7 +2099,7 @@
           <a:p>
             <a:fld id="{6ADAF93B-E815-47CD-A333-40DA8D7FC746}" type="datetimeFigureOut">
               <a:rPr lang="en-IE" smtClean="0"/>
-              <a:t>17/01/2019</a:t>
+              <a:t>10/02/2019</a:t>
             </a:fld>
             <a:endParaRPr lang="en-IE"/>
           </a:p>
@@ -2399,7 +2412,7 @@
           <a:p>
             <a:fld id="{6ADAF93B-E815-47CD-A333-40DA8D7FC746}" type="datetimeFigureOut">
               <a:rPr lang="en-IE" smtClean="0"/>
-              <a:t>17/01/2019</a:t>
+              <a:t>10/02/2019</a:t>
             </a:fld>
             <a:endParaRPr lang="en-IE"/>
           </a:p>
@@ -2688,7 +2701,7 @@
           <a:p>
             <a:fld id="{6ADAF93B-E815-47CD-A333-40DA8D7FC746}" type="datetimeFigureOut">
               <a:rPr lang="en-IE" smtClean="0"/>
-              <a:t>17/01/2019</a:t>
+              <a:t>10/02/2019</a:t>
             </a:fld>
             <a:endParaRPr lang="en-IE"/>
           </a:p>
@@ -2931,7 +2944,7 @@
           <a:p>
             <a:fld id="{6ADAF93B-E815-47CD-A333-40DA8D7FC746}" type="datetimeFigureOut">
               <a:rPr lang="en-IE" smtClean="0"/>
-              <a:t>17/01/2019</a:t>
+              <a:t>10/02/2019</a:t>
             </a:fld>
             <a:endParaRPr lang="en-IE"/>
           </a:p>
@@ -3565,6 +3578,410 @@
         </p:blipFill>
         <p:spPr>
           <a:xfrm>
+            <a:off x="0" y="216462"/>
+            <a:ext cx="5830645" cy="1943548"/>
+          </a:xfrm>
+          <a:prstGeom prst="rect">
+            <a:avLst/>
+          </a:prstGeom>
+        </p:spPr>
+      </p:pic>
+      <p:cxnSp>
+        <p:nvCxnSpPr>
+          <p:cNvPr id="7" name="Straight Connector 6">
+            <a:extLst>
+              <a:ext uri="{FF2B5EF4-FFF2-40B4-BE49-F238E27FC236}">
+                <a16:creationId xmlns:a16="http://schemas.microsoft.com/office/drawing/2014/main" id="{E8D49382-E63A-42FE-99EC-ABEBE26E98A2}"/>
+              </a:ext>
+            </a:extLst>
+          </p:cNvPr>
+          <p:cNvCxnSpPr>
+            <a:cxnSpLocks/>
+          </p:cNvCxnSpPr>
+          <p:nvPr/>
+        </p:nvCxnSpPr>
+        <p:spPr>
+          <a:xfrm>
+            <a:off x="5669279" y="637504"/>
+            <a:ext cx="0" cy="1140311"/>
+          </a:xfrm>
+          <a:prstGeom prst="line">
+            <a:avLst/>
+          </a:prstGeom>
+          <a:ln w="28575">
+            <a:solidFill>
+              <a:srgbClr val="758A35"/>
+            </a:solidFill>
+          </a:ln>
+        </p:spPr>
+        <p:style>
+          <a:lnRef idx="1">
+            <a:schemeClr val="accent1"/>
+          </a:lnRef>
+          <a:fillRef idx="0">
+            <a:schemeClr val="accent1"/>
+          </a:fillRef>
+          <a:effectRef idx="0">
+            <a:schemeClr val="accent1"/>
+          </a:effectRef>
+          <a:fontRef idx="minor">
+            <a:schemeClr val="tx1"/>
+          </a:fontRef>
+        </p:style>
+      </p:cxnSp>
+      <p:sp>
+        <p:nvSpPr>
+          <p:cNvPr id="8" name="TextBox 7">
+            <a:extLst>
+              <a:ext uri="{FF2B5EF4-FFF2-40B4-BE49-F238E27FC236}">
+                <a16:creationId xmlns:a16="http://schemas.microsoft.com/office/drawing/2014/main" id="{C52040A8-C430-40B1-BF1D-CE02E3308668}"/>
+              </a:ext>
+            </a:extLst>
+          </p:cNvPr>
+          <p:cNvSpPr txBox="1"/>
+          <p:nvPr/>
+        </p:nvSpPr>
+        <p:spPr>
+          <a:xfrm>
+            <a:off x="5879279" y="1144694"/>
+            <a:ext cx="5246949" cy="830997"/>
+          </a:xfrm>
+          <a:prstGeom prst="rect">
+            <a:avLst/>
+          </a:prstGeom>
+          <a:noFill/>
+        </p:spPr>
+        <p:txBody>
+          <a:bodyPr wrap="none" rtlCol="0">
+            <a:spAutoFit/>
+          </a:bodyPr>
+          <a:lstStyle/>
+          <a:p>
+            <a:r>
+              <a:rPr lang="en-IE" sz="4800" b="1" dirty="0" err="1">
+                <a:solidFill>
+                  <a:srgbClr val="758A35"/>
+                </a:solidFill>
+                <a:latin typeface="Overlock" panose="02000506030000020004" pitchFamily="2" charset="0"/>
+              </a:rPr>
+              <a:t>Gairdín</a:t>
+            </a:r>
+            <a:r>
+              <a:rPr lang="en-IE" sz="4800" b="1" dirty="0">
+                <a:solidFill>
+                  <a:srgbClr val="758A35"/>
+                </a:solidFill>
+                <a:latin typeface="Overlock" panose="02000506030000020004" pitchFamily="2" charset="0"/>
+              </a:rPr>
+              <a:t> </a:t>
+            </a:r>
+            <a:r>
+              <a:rPr lang="en-IE" sz="4800" b="1" dirty="0" err="1">
+                <a:solidFill>
+                  <a:srgbClr val="758A35"/>
+                </a:solidFill>
+                <a:latin typeface="Overlock" panose="02000506030000020004" pitchFamily="2" charset="0"/>
+              </a:rPr>
+              <a:t>Beo</a:t>
+            </a:r>
+            <a:r>
+              <a:rPr lang="en-IE" sz="4800" b="1" dirty="0">
+                <a:solidFill>
+                  <a:srgbClr val="758A35"/>
+                </a:solidFill>
+                <a:latin typeface="Overlock" panose="02000506030000020004" pitchFamily="2" charset="0"/>
+              </a:rPr>
+              <a:t>, Carlow</a:t>
+            </a:r>
+          </a:p>
+        </p:txBody>
+      </p:sp>
+      <p:sp>
+        <p:nvSpPr>
+          <p:cNvPr id="9" name="TextBox 8">
+            <a:extLst>
+              <a:ext uri="{FF2B5EF4-FFF2-40B4-BE49-F238E27FC236}">
+                <a16:creationId xmlns:a16="http://schemas.microsoft.com/office/drawing/2014/main" id="{52A797FA-AE42-4390-A974-0BAD7C03C39B}"/>
+              </a:ext>
+            </a:extLst>
+          </p:cNvPr>
+          <p:cNvSpPr txBox="1"/>
+          <p:nvPr/>
+        </p:nvSpPr>
+        <p:spPr>
+          <a:xfrm>
+            <a:off x="5908305" y="477850"/>
+            <a:ext cx="5941050" cy="830997"/>
+          </a:xfrm>
+          <a:prstGeom prst="rect">
+            <a:avLst/>
+          </a:prstGeom>
+          <a:noFill/>
+        </p:spPr>
+        <p:txBody>
+          <a:bodyPr wrap="none" rtlCol="0">
+            <a:spAutoFit/>
+          </a:bodyPr>
+          <a:lstStyle/>
+          <a:p>
+            <a:r>
+              <a:rPr lang="en-IE" sz="4800" b="1" dirty="0">
+                <a:solidFill>
+                  <a:srgbClr val="FF7345"/>
+                </a:solidFill>
+                <a:latin typeface="Overlock" panose="02000506030000020004" pitchFamily="2" charset="0"/>
+              </a:rPr>
+              <a:t>Sunday, April 14, 2019</a:t>
+            </a:r>
+          </a:p>
+        </p:txBody>
+      </p:sp>
+      <p:pic>
+        <p:nvPicPr>
+          <p:cNvPr id="6" name="Picture 5">
+            <a:extLst>
+              <a:ext uri="{FF2B5EF4-FFF2-40B4-BE49-F238E27FC236}">
+                <a16:creationId xmlns:a16="http://schemas.microsoft.com/office/drawing/2014/main" id="{01141429-7398-4966-9A29-24E3BF84AAB0}"/>
+              </a:ext>
+            </a:extLst>
+          </p:cNvPr>
+          <p:cNvPicPr>
+            <a:picLocks noChangeAspect="1"/>
+          </p:cNvPicPr>
+          <p:nvPr/>
+        </p:nvPicPr>
+        <p:blipFill>
+          <a:blip r:embed="rId2">
+            <a:extLst>
+              <a:ext uri="{28A0092B-C50C-407E-A947-70E740481C1C}">
+                <a14:useLocalDpi xmlns:a14="http://schemas.microsoft.com/office/drawing/2010/main" val="0"/>
+              </a:ext>
+            </a:extLst>
+          </a:blip>
+          <a:stretch>
+            <a:fillRect/>
+          </a:stretch>
+        </p:blipFill>
+        <p:spPr>
+          <a:xfrm>
+            <a:off x="258100" y="2639062"/>
+            <a:ext cx="5830645" cy="1943548"/>
+          </a:xfrm>
+          <a:prstGeom prst="rect">
+            <a:avLst/>
+          </a:prstGeom>
+        </p:spPr>
+      </p:pic>
+      <p:cxnSp>
+        <p:nvCxnSpPr>
+          <p:cNvPr id="10" name="Straight Connector 9">
+            <a:extLst>
+              <a:ext uri="{FF2B5EF4-FFF2-40B4-BE49-F238E27FC236}">
+                <a16:creationId xmlns:a16="http://schemas.microsoft.com/office/drawing/2014/main" id="{A45D4F90-6089-4F23-BFB6-7DE2036EF2A8}"/>
+              </a:ext>
+            </a:extLst>
+          </p:cNvPr>
+          <p:cNvCxnSpPr>
+            <a:cxnSpLocks/>
+          </p:cNvCxnSpPr>
+          <p:nvPr/>
+        </p:nvCxnSpPr>
+        <p:spPr>
+          <a:xfrm flipH="1">
+            <a:off x="831819" y="4646163"/>
+            <a:ext cx="4683206" cy="0"/>
+          </a:xfrm>
+          <a:prstGeom prst="line">
+            <a:avLst/>
+          </a:prstGeom>
+          <a:ln w="28575">
+            <a:solidFill>
+              <a:srgbClr val="758A35"/>
+            </a:solidFill>
+          </a:ln>
+        </p:spPr>
+        <p:style>
+          <a:lnRef idx="1">
+            <a:schemeClr val="accent1"/>
+          </a:lnRef>
+          <a:fillRef idx="0">
+            <a:schemeClr val="accent1"/>
+          </a:fillRef>
+          <a:effectRef idx="0">
+            <a:schemeClr val="accent1"/>
+          </a:effectRef>
+          <a:fontRef idx="minor">
+            <a:schemeClr val="tx1"/>
+          </a:fontRef>
+        </p:style>
+      </p:cxnSp>
+      <p:sp>
+        <p:nvSpPr>
+          <p:cNvPr id="11" name="TextBox 10">
+            <a:extLst>
+              <a:ext uri="{FF2B5EF4-FFF2-40B4-BE49-F238E27FC236}">
+                <a16:creationId xmlns:a16="http://schemas.microsoft.com/office/drawing/2014/main" id="{FFF3364D-1D58-499E-A37D-5236C8831466}"/>
+              </a:ext>
+            </a:extLst>
+          </p:cNvPr>
+          <p:cNvSpPr txBox="1"/>
+          <p:nvPr/>
+        </p:nvSpPr>
+        <p:spPr>
+          <a:xfrm>
+            <a:off x="549948" y="5313007"/>
+            <a:ext cx="5246949" cy="830997"/>
+          </a:xfrm>
+          <a:prstGeom prst="rect">
+            <a:avLst/>
+          </a:prstGeom>
+          <a:noFill/>
+        </p:spPr>
+        <p:txBody>
+          <a:bodyPr wrap="none" rtlCol="0">
+            <a:spAutoFit/>
+          </a:bodyPr>
+          <a:lstStyle/>
+          <a:p>
+            <a:pPr algn="ctr"/>
+            <a:r>
+              <a:rPr lang="en-IE" sz="4800" b="1" dirty="0" err="1">
+                <a:solidFill>
+                  <a:srgbClr val="758A35"/>
+                </a:solidFill>
+                <a:latin typeface="Overlock" panose="02000506030000020004" pitchFamily="2" charset="0"/>
+              </a:rPr>
+              <a:t>Gairdín</a:t>
+            </a:r>
+            <a:r>
+              <a:rPr lang="en-IE" sz="4800" b="1" dirty="0">
+                <a:solidFill>
+                  <a:srgbClr val="758A35"/>
+                </a:solidFill>
+                <a:latin typeface="Overlock" panose="02000506030000020004" pitchFamily="2" charset="0"/>
+              </a:rPr>
+              <a:t> </a:t>
+            </a:r>
+            <a:r>
+              <a:rPr lang="en-IE" sz="4800" b="1" dirty="0" err="1">
+                <a:solidFill>
+                  <a:srgbClr val="758A35"/>
+                </a:solidFill>
+                <a:latin typeface="Overlock" panose="02000506030000020004" pitchFamily="2" charset="0"/>
+              </a:rPr>
+              <a:t>Beo</a:t>
+            </a:r>
+            <a:r>
+              <a:rPr lang="en-IE" sz="4800" b="1" dirty="0">
+                <a:solidFill>
+                  <a:srgbClr val="758A35"/>
+                </a:solidFill>
+                <a:latin typeface="Overlock" panose="02000506030000020004" pitchFamily="2" charset="0"/>
+              </a:rPr>
+              <a:t>, Carlow</a:t>
+            </a:r>
+          </a:p>
+        </p:txBody>
+      </p:sp>
+      <p:sp>
+        <p:nvSpPr>
+          <p:cNvPr id="12" name="TextBox 11">
+            <a:extLst>
+              <a:ext uri="{FF2B5EF4-FFF2-40B4-BE49-F238E27FC236}">
+                <a16:creationId xmlns:a16="http://schemas.microsoft.com/office/drawing/2014/main" id="{90F7531D-29FA-4FD8-8962-3A510A88F3A0}"/>
+              </a:ext>
+            </a:extLst>
+          </p:cNvPr>
+          <p:cNvSpPr txBox="1"/>
+          <p:nvPr/>
+        </p:nvSpPr>
+        <p:spPr>
+          <a:xfrm>
+            <a:off x="202897" y="4646163"/>
+            <a:ext cx="5941050" cy="830997"/>
+          </a:xfrm>
+          <a:prstGeom prst="rect">
+            <a:avLst/>
+          </a:prstGeom>
+          <a:noFill/>
+        </p:spPr>
+        <p:txBody>
+          <a:bodyPr wrap="none" rtlCol="0">
+            <a:spAutoFit/>
+          </a:bodyPr>
+          <a:lstStyle/>
+          <a:p>
+            <a:pPr algn="ctr"/>
+            <a:r>
+              <a:rPr lang="en-IE" sz="4800" b="1" dirty="0">
+                <a:solidFill>
+                  <a:srgbClr val="FF7345"/>
+                </a:solidFill>
+                <a:latin typeface="Overlock" panose="02000506030000020004" pitchFamily="2" charset="0"/>
+              </a:rPr>
+              <a:t>Sunday, April 14, 2019</a:t>
+            </a:r>
+          </a:p>
+        </p:txBody>
+      </p:sp>
+    </p:spTree>
+    <p:extLst>
+      <p:ext uri="{BB962C8B-B14F-4D97-AF65-F5344CB8AC3E}">
+        <p14:creationId xmlns:p14="http://schemas.microsoft.com/office/powerpoint/2010/main" val="4138489596"/>
+      </p:ext>
+    </p:extLst>
+  </p:cSld>
+  <p:clrMapOvr>
+    <a:masterClrMapping/>
+  </p:clrMapOvr>
+</p:sld>
+</file>
+
+<file path=ppt/slides/slide3.xml><?xml version="1.0" encoding="utf-8"?>
+<p:sld xmlns:a="http://schemas.openxmlformats.org/drawingml/2006/main" xmlns:r="http://schemas.openxmlformats.org/officeDocument/2006/relationships" xmlns:p="http://schemas.openxmlformats.org/presentationml/2006/main">
+  <p:cSld>
+    <p:spTree>
+      <p:nvGrpSpPr>
+        <p:cNvPr id="1" name=""/>
+        <p:cNvGrpSpPr/>
+        <p:nvPr/>
+      </p:nvGrpSpPr>
+      <p:grpSpPr>
+        <a:xfrm>
+          <a:off x="0" y="0"/>
+          <a:ext cx="0" cy="0"/>
+          <a:chOff x="0" y="0"/>
+          <a:chExt cx="0" cy="0"/>
+        </a:xfrm>
+      </p:grpSpPr>
+      <p:pic>
+        <p:nvPicPr>
+          <p:cNvPr id="5" name="Picture 4">
+            <a:extLst>
+              <a:ext uri="{FF2B5EF4-FFF2-40B4-BE49-F238E27FC236}">
+                <a16:creationId xmlns:a16="http://schemas.microsoft.com/office/drawing/2014/main" id="{A173DC9F-C673-4C8E-89CC-9629B2861D74}"/>
+              </a:ext>
+            </a:extLst>
+          </p:cNvPr>
+          <p:cNvPicPr>
+            <a:picLocks noChangeAspect="1"/>
+          </p:cNvPicPr>
+          <p:nvPr/>
+        </p:nvPicPr>
+        <p:blipFill>
+          <a:blip r:embed="rId2">
+            <a:extLst>
+              <a:ext uri="{28A0092B-C50C-407E-A947-70E740481C1C}">
+                <a14:useLocalDpi xmlns:a14="http://schemas.microsoft.com/office/drawing/2010/main" val="0"/>
+              </a:ext>
+            </a:extLst>
+          </a:blip>
+          <a:stretch>
+            <a:fillRect/>
+          </a:stretch>
+        </p:blipFill>
+        <p:spPr>
+          <a:xfrm>
             <a:off x="-246915" y="0"/>
             <a:ext cx="5830645" cy="1943548"/>
           </a:xfrm>
@@ -3573,12 +3990,55 @@
           </a:prstGeom>
         </p:spPr>
       </p:pic>
-      <p:sp>
-        <p:nvSpPr>
-          <p:cNvPr id="8" name="TextBox 7">
-            <a:extLst>
-              <a:ext uri="{FF2B5EF4-FFF2-40B4-BE49-F238E27FC236}">
-                <a16:creationId xmlns:a16="http://schemas.microsoft.com/office/drawing/2014/main" id="{C52040A8-C430-40B1-BF1D-CE02E3308668}"/>
+      <p:cxnSp>
+        <p:nvCxnSpPr>
+          <p:cNvPr id="6" name="Straight Connector 5">
+            <a:extLst>
+              <a:ext uri="{FF2B5EF4-FFF2-40B4-BE49-F238E27FC236}">
+                <a16:creationId xmlns:a16="http://schemas.microsoft.com/office/drawing/2014/main" id="{7E373742-6093-481A-9C58-650115813F0F}"/>
+              </a:ext>
+            </a:extLst>
+          </p:cNvPr>
+          <p:cNvCxnSpPr>
+            <a:cxnSpLocks/>
+          </p:cNvCxnSpPr>
+          <p:nvPr/>
+        </p:nvCxnSpPr>
+        <p:spPr>
+          <a:xfrm flipH="1">
+            <a:off x="326804" y="2025768"/>
+            <a:ext cx="4683206" cy="0"/>
+          </a:xfrm>
+          <a:prstGeom prst="line">
+            <a:avLst/>
+          </a:prstGeom>
+          <a:ln w="28575">
+            <a:solidFill>
+              <a:srgbClr val="758A35"/>
+            </a:solidFill>
+          </a:ln>
+        </p:spPr>
+        <p:style>
+          <a:lnRef idx="1">
+            <a:schemeClr val="accent1"/>
+          </a:lnRef>
+          <a:fillRef idx="0">
+            <a:schemeClr val="accent1"/>
+          </a:fillRef>
+          <a:effectRef idx="0">
+            <a:schemeClr val="accent1"/>
+          </a:effectRef>
+          <a:fontRef idx="minor">
+            <a:schemeClr val="tx1"/>
+          </a:fontRef>
+        </p:style>
+      </p:cxnSp>
+      <p:sp>
+        <p:nvSpPr>
+          <p:cNvPr id="7" name="TextBox 6">
+            <a:extLst>
+              <a:ext uri="{FF2B5EF4-FFF2-40B4-BE49-F238E27FC236}">
+                <a16:creationId xmlns:a16="http://schemas.microsoft.com/office/drawing/2014/main" id="{03E1A0DB-C217-45F0-9B16-4EE0949B06EA}"/>
               </a:ext>
             </a:extLst>
           </p:cNvPr>
@@ -3587,8 +4047,8 @@
         </p:nvSpPr>
         <p:spPr>
           <a:xfrm>
-            <a:off x="1057229" y="2795285"/>
-            <a:ext cx="3222357" cy="1323439"/>
+            <a:off x="633235" y="2040516"/>
+            <a:ext cx="4070345" cy="2492990"/>
           </a:xfrm>
           <a:prstGeom prst="rect">
             <a:avLst/>
@@ -3601,8 +4061,48 @@
           </a:bodyPr>
           <a:lstStyle/>
           <a:p>
-            <a:r>
-              <a:rPr lang="en-IE" sz="8000" b="1" dirty="0">
+            <a:pPr algn="ctr"/>
+            <a:r>
+              <a:rPr lang="en-IE" sz="6000" b="1" dirty="0" err="1">
+                <a:solidFill>
+                  <a:srgbClr val="758A35"/>
+                </a:solidFill>
+                <a:latin typeface="Overlock" panose="02000506030000020004" pitchFamily="2" charset="0"/>
+              </a:rPr>
+              <a:t>Gairdín</a:t>
+            </a:r>
+            <a:r>
+              <a:rPr lang="en-IE" sz="6000" b="1" dirty="0">
+                <a:solidFill>
+                  <a:srgbClr val="758A35"/>
+                </a:solidFill>
+                <a:latin typeface="Overlock" panose="02000506030000020004" pitchFamily="2" charset="0"/>
+              </a:rPr>
+              <a:t> </a:t>
+            </a:r>
+            <a:r>
+              <a:rPr lang="en-IE" sz="6000" b="1" dirty="0" err="1">
+                <a:solidFill>
+                  <a:srgbClr val="758A35"/>
+                </a:solidFill>
+                <a:latin typeface="Overlock" panose="02000506030000020004" pitchFamily="2" charset="0"/>
+              </a:rPr>
+              <a:t>Beo</a:t>
+            </a:r>
+            <a:r>
+              <a:rPr lang="en-IE" sz="6000" b="1" dirty="0">
+                <a:solidFill>
+                  <a:srgbClr val="758A35"/>
+                </a:solidFill>
+                <a:latin typeface="Overlock" panose="02000506030000020004" pitchFamily="2" charset="0"/>
+              </a:rPr>
+              <a:t>,</a:t>
+            </a:r>
+          </a:p>
+          <a:p>
+            <a:pPr algn="ctr"/>
+            <a:r>
+              <a:rPr lang="en-IE" sz="9600" b="1" dirty="0">
                 <a:solidFill>
                   <a:srgbClr val="758A35"/>
                 </a:solidFill>
@@ -3615,10 +4115,10 @@
       </p:sp>
       <p:sp>
         <p:nvSpPr>
-          <p:cNvPr id="9" name="TextBox 8">
-            <a:extLst>
-              <a:ext uri="{FF2B5EF4-FFF2-40B4-BE49-F238E27FC236}">
-                <a16:creationId xmlns:a16="http://schemas.microsoft.com/office/drawing/2014/main" id="{52A797FA-AE42-4390-A974-0BAD7C03C39B}"/>
+          <p:cNvPr id="10" name="TextBox 9">
+            <a:extLst>
+              <a:ext uri="{FF2B5EF4-FFF2-40B4-BE49-F238E27FC236}">
+                <a16:creationId xmlns:a16="http://schemas.microsoft.com/office/drawing/2014/main" id="{8ACC2263-B87F-444E-8231-B322C7C1B517}"/>
               </a:ext>
             </a:extLst>
           </p:cNvPr>
@@ -3627,8 +4127,8 @@
         </p:nvSpPr>
         <p:spPr>
           <a:xfrm>
-            <a:off x="368739" y="4970461"/>
-            <a:ext cx="4599336" cy="1323439"/>
+            <a:off x="424043" y="4365010"/>
+            <a:ext cx="4488729" cy="2492990"/>
           </a:xfrm>
           <a:prstGeom prst="rect">
             <a:avLst/>
@@ -3641,18 +4141,83 @@
           </a:bodyPr>
           <a:lstStyle/>
           <a:p>
-            <a:r>
-              <a:rPr lang="en-IE" sz="8000" b="1" dirty="0">
+            <a:pPr algn="ctr"/>
+            <a:r>
+              <a:rPr lang="en-IE" sz="9600" b="1" dirty="0">
                 <a:solidFill>
                   <a:srgbClr val="FF7345"/>
                 </a:solidFill>
                 <a:latin typeface="Overlock" panose="02000506030000020004" pitchFamily="2" charset="0"/>
               </a:rPr>
-              <a:t>April 2019</a:t>
-            </a:r>
-          </a:p>
-        </p:txBody>
-      </p:sp>
+              <a:t>Sunday,</a:t>
+            </a:r>
+            <a:r>
+              <a:rPr lang="en-IE" sz="6000" b="1" dirty="0">
+                <a:solidFill>
+                  <a:srgbClr val="FF7345"/>
+                </a:solidFill>
+                <a:latin typeface="Overlock" panose="02000506030000020004" pitchFamily="2" charset="0"/>
+              </a:rPr>
+              <a:t> </a:t>
+            </a:r>
+          </a:p>
+          <a:p>
+            <a:pPr algn="ctr"/>
+            <a:r>
+              <a:rPr lang="en-IE" sz="6000" b="1" dirty="0">
+                <a:solidFill>
+                  <a:srgbClr val="FF7345"/>
+                </a:solidFill>
+                <a:latin typeface="Overlock" panose="02000506030000020004" pitchFamily="2" charset="0"/>
+              </a:rPr>
+              <a:t>April 14 2019</a:t>
+            </a:r>
+          </a:p>
+        </p:txBody>
+      </p:sp>
+      <p:cxnSp>
+        <p:nvCxnSpPr>
+          <p:cNvPr id="11" name="Straight Connector 10">
+            <a:extLst>
+              <a:ext uri="{FF2B5EF4-FFF2-40B4-BE49-F238E27FC236}">
+                <a16:creationId xmlns:a16="http://schemas.microsoft.com/office/drawing/2014/main" id="{0832D9A4-1D1C-44B3-BE73-4D250E28525C}"/>
+              </a:ext>
+            </a:extLst>
+          </p:cNvPr>
+          <p:cNvCxnSpPr>
+            <a:cxnSpLocks/>
+          </p:cNvCxnSpPr>
+          <p:nvPr/>
+        </p:nvCxnSpPr>
+        <p:spPr>
+          <a:xfrm flipH="1">
+            <a:off x="326804" y="4425676"/>
+            <a:ext cx="4683206" cy="0"/>
+          </a:xfrm>
+          <a:prstGeom prst="line">
+            <a:avLst/>
+          </a:prstGeom>
+          <a:ln w="28575">
+            <a:solidFill>
+              <a:srgbClr val="758A35"/>
+            </a:solidFill>
+          </a:ln>
+        </p:spPr>
+        <p:style>
+          <a:lnRef idx="1">
+            <a:schemeClr val="accent1"/>
+          </a:lnRef>
+          <a:fillRef idx="0">
+            <a:schemeClr val="accent1"/>
+          </a:fillRef>
+          <a:effectRef idx="0">
+            <a:schemeClr val="accent1"/>
+          </a:effectRef>
+          <a:fontRef idx="minor">
+            <a:schemeClr val="tx1"/>
+          </a:fontRef>
+        </p:style>
+      </p:cxnSp>
     </p:spTree>
     <p:extLst>
       <p:ext uri="{BB962C8B-B14F-4D97-AF65-F5344CB8AC3E}">

</xml_diff>

<commit_message>
removes venue for now (until confirmed)
</commit_message>
<xml_diff>
--- a/images/events/2019-04-festival/templates.pptx
+++ b/images/events/2019-04-festival/templates.pptx
@@ -7,7 +7,8 @@
   <p:sldIdLst>
     <p:sldId id="256" r:id="rId2"/>
     <p:sldId id="258" r:id="rId3"/>
-    <p:sldId id="257" r:id="rId4"/>
+    <p:sldId id="259" r:id="rId4"/>
+    <p:sldId id="257" r:id="rId5"/>
   </p:sldIdLst>
   <p:sldSz cx="12192000" cy="6858000"/>
   <p:notesSz cx="6858000" cy="9144000"/>
@@ -3982,7 +3983,7 @@
         </p:blipFill>
         <p:spPr>
           <a:xfrm>
-            <a:off x="-246915" y="0"/>
+            <a:off x="0" y="216462"/>
             <a:ext cx="5830645" cy="1943548"/>
           </a:xfrm>
           <a:prstGeom prst="rect">
@@ -3992,10 +3993,10 @@
       </p:pic>
       <p:cxnSp>
         <p:nvCxnSpPr>
-          <p:cNvPr id="6" name="Straight Connector 5">
-            <a:extLst>
-              <a:ext uri="{FF2B5EF4-FFF2-40B4-BE49-F238E27FC236}">
-                <a16:creationId xmlns:a16="http://schemas.microsoft.com/office/drawing/2014/main" id="{7E373742-6093-481A-9C58-650115813F0F}"/>
+          <p:cNvPr id="7" name="Straight Connector 6">
+            <a:extLst>
+              <a:ext uri="{FF2B5EF4-FFF2-40B4-BE49-F238E27FC236}">
+                <a16:creationId xmlns:a16="http://schemas.microsoft.com/office/drawing/2014/main" id="{E8D49382-E63A-42FE-99EC-ABEBE26E98A2}"/>
               </a:ext>
             </a:extLst>
           </p:cNvPr>
@@ -4005,9 +4006,9 @@
           <p:nvPr/>
         </p:nvCxnSpPr>
         <p:spPr>
-          <a:xfrm flipH="1">
-            <a:off x="326804" y="2025768"/>
-            <a:ext cx="4683206" cy="0"/>
+          <a:xfrm>
+            <a:off x="5669279" y="637504"/>
+            <a:ext cx="0" cy="1140311"/>
           </a:xfrm>
           <a:prstGeom prst="line">
             <a:avLst/>
@@ -4035,6 +4036,356 @@
       </p:cxnSp>
       <p:sp>
         <p:nvSpPr>
+          <p:cNvPr id="8" name="TextBox 7">
+            <a:extLst>
+              <a:ext uri="{FF2B5EF4-FFF2-40B4-BE49-F238E27FC236}">
+                <a16:creationId xmlns:a16="http://schemas.microsoft.com/office/drawing/2014/main" id="{C52040A8-C430-40B1-BF1D-CE02E3308668}"/>
+              </a:ext>
+            </a:extLst>
+          </p:cNvPr>
+          <p:cNvSpPr txBox="1"/>
+          <p:nvPr/>
+        </p:nvSpPr>
+        <p:spPr>
+          <a:xfrm>
+            <a:off x="5879279" y="1144694"/>
+            <a:ext cx="2007281" cy="830997"/>
+          </a:xfrm>
+          <a:prstGeom prst="rect">
+            <a:avLst/>
+          </a:prstGeom>
+          <a:noFill/>
+        </p:spPr>
+        <p:txBody>
+          <a:bodyPr wrap="none" rtlCol="0">
+            <a:spAutoFit/>
+          </a:bodyPr>
+          <a:lstStyle/>
+          <a:p>
+            <a:r>
+              <a:rPr lang="en-IE" sz="4800" b="1" dirty="0">
+                <a:solidFill>
+                  <a:srgbClr val="758A35"/>
+                </a:solidFill>
+                <a:latin typeface="Overlock" panose="02000506030000020004" pitchFamily="2" charset="0"/>
+              </a:rPr>
+              <a:t>Carlow</a:t>
+            </a:r>
+          </a:p>
+        </p:txBody>
+      </p:sp>
+      <p:sp>
+        <p:nvSpPr>
+          <p:cNvPr id="9" name="TextBox 8">
+            <a:extLst>
+              <a:ext uri="{FF2B5EF4-FFF2-40B4-BE49-F238E27FC236}">
+                <a16:creationId xmlns:a16="http://schemas.microsoft.com/office/drawing/2014/main" id="{52A797FA-AE42-4390-A974-0BAD7C03C39B}"/>
+              </a:ext>
+            </a:extLst>
+          </p:cNvPr>
+          <p:cNvSpPr txBox="1"/>
+          <p:nvPr/>
+        </p:nvSpPr>
+        <p:spPr>
+          <a:xfrm>
+            <a:off x="5908305" y="477850"/>
+            <a:ext cx="5941050" cy="830997"/>
+          </a:xfrm>
+          <a:prstGeom prst="rect">
+            <a:avLst/>
+          </a:prstGeom>
+          <a:noFill/>
+        </p:spPr>
+        <p:txBody>
+          <a:bodyPr wrap="none" rtlCol="0">
+            <a:spAutoFit/>
+          </a:bodyPr>
+          <a:lstStyle/>
+          <a:p>
+            <a:r>
+              <a:rPr lang="en-IE" sz="4800" b="1" dirty="0">
+                <a:solidFill>
+                  <a:srgbClr val="FF7345"/>
+                </a:solidFill>
+                <a:latin typeface="Overlock" panose="02000506030000020004" pitchFamily="2" charset="0"/>
+              </a:rPr>
+              <a:t>Sunday, April 14, 2019</a:t>
+            </a:r>
+          </a:p>
+        </p:txBody>
+      </p:sp>
+      <p:pic>
+        <p:nvPicPr>
+          <p:cNvPr id="6" name="Picture 5">
+            <a:extLst>
+              <a:ext uri="{FF2B5EF4-FFF2-40B4-BE49-F238E27FC236}">
+                <a16:creationId xmlns:a16="http://schemas.microsoft.com/office/drawing/2014/main" id="{01141429-7398-4966-9A29-24E3BF84AAB0}"/>
+              </a:ext>
+            </a:extLst>
+          </p:cNvPr>
+          <p:cNvPicPr>
+            <a:picLocks noChangeAspect="1"/>
+          </p:cNvPicPr>
+          <p:nvPr/>
+        </p:nvPicPr>
+        <p:blipFill>
+          <a:blip r:embed="rId2">
+            <a:extLst>
+              <a:ext uri="{28A0092B-C50C-407E-A947-70E740481C1C}">
+                <a14:useLocalDpi xmlns:a14="http://schemas.microsoft.com/office/drawing/2010/main" val="0"/>
+              </a:ext>
+            </a:extLst>
+          </a:blip>
+          <a:stretch>
+            <a:fillRect/>
+          </a:stretch>
+        </p:blipFill>
+        <p:spPr>
+          <a:xfrm>
+            <a:off x="258100" y="2639062"/>
+            <a:ext cx="5830645" cy="1943548"/>
+          </a:xfrm>
+          <a:prstGeom prst="rect">
+            <a:avLst/>
+          </a:prstGeom>
+        </p:spPr>
+      </p:pic>
+      <p:cxnSp>
+        <p:nvCxnSpPr>
+          <p:cNvPr id="10" name="Straight Connector 9">
+            <a:extLst>
+              <a:ext uri="{FF2B5EF4-FFF2-40B4-BE49-F238E27FC236}">
+                <a16:creationId xmlns:a16="http://schemas.microsoft.com/office/drawing/2014/main" id="{A45D4F90-6089-4F23-BFB6-7DE2036EF2A8}"/>
+              </a:ext>
+            </a:extLst>
+          </p:cNvPr>
+          <p:cNvCxnSpPr>
+            <a:cxnSpLocks/>
+          </p:cNvCxnSpPr>
+          <p:nvPr/>
+        </p:nvCxnSpPr>
+        <p:spPr>
+          <a:xfrm flipH="1">
+            <a:off x="831819" y="4646163"/>
+            <a:ext cx="4683206" cy="0"/>
+          </a:xfrm>
+          <a:prstGeom prst="line">
+            <a:avLst/>
+          </a:prstGeom>
+          <a:ln w="28575">
+            <a:solidFill>
+              <a:srgbClr val="758A35"/>
+            </a:solidFill>
+          </a:ln>
+        </p:spPr>
+        <p:style>
+          <a:lnRef idx="1">
+            <a:schemeClr val="accent1"/>
+          </a:lnRef>
+          <a:fillRef idx="0">
+            <a:schemeClr val="accent1"/>
+          </a:fillRef>
+          <a:effectRef idx="0">
+            <a:schemeClr val="accent1"/>
+          </a:effectRef>
+          <a:fontRef idx="minor">
+            <a:schemeClr val="tx1"/>
+          </a:fontRef>
+        </p:style>
+      </p:cxnSp>
+      <p:sp>
+        <p:nvSpPr>
+          <p:cNvPr id="11" name="TextBox 10">
+            <a:extLst>
+              <a:ext uri="{FF2B5EF4-FFF2-40B4-BE49-F238E27FC236}">
+                <a16:creationId xmlns:a16="http://schemas.microsoft.com/office/drawing/2014/main" id="{FFF3364D-1D58-499E-A37D-5236C8831466}"/>
+              </a:ext>
+            </a:extLst>
+          </p:cNvPr>
+          <p:cNvSpPr txBox="1"/>
+          <p:nvPr/>
+        </p:nvSpPr>
+        <p:spPr>
+          <a:xfrm>
+            <a:off x="2169782" y="5313007"/>
+            <a:ext cx="2007281" cy="830997"/>
+          </a:xfrm>
+          <a:prstGeom prst="rect">
+            <a:avLst/>
+          </a:prstGeom>
+          <a:noFill/>
+        </p:spPr>
+        <p:txBody>
+          <a:bodyPr wrap="none" rtlCol="0">
+            <a:spAutoFit/>
+          </a:bodyPr>
+          <a:lstStyle/>
+          <a:p>
+            <a:pPr algn="ctr"/>
+            <a:r>
+              <a:rPr lang="en-IE" sz="4800" b="1" dirty="0">
+                <a:solidFill>
+                  <a:srgbClr val="758A35"/>
+                </a:solidFill>
+                <a:latin typeface="Overlock" panose="02000506030000020004" pitchFamily="2" charset="0"/>
+              </a:rPr>
+              <a:t>Carlow</a:t>
+            </a:r>
+          </a:p>
+        </p:txBody>
+      </p:sp>
+      <p:sp>
+        <p:nvSpPr>
+          <p:cNvPr id="12" name="TextBox 11">
+            <a:extLst>
+              <a:ext uri="{FF2B5EF4-FFF2-40B4-BE49-F238E27FC236}">
+                <a16:creationId xmlns:a16="http://schemas.microsoft.com/office/drawing/2014/main" id="{90F7531D-29FA-4FD8-8962-3A510A88F3A0}"/>
+              </a:ext>
+            </a:extLst>
+          </p:cNvPr>
+          <p:cNvSpPr txBox="1"/>
+          <p:nvPr/>
+        </p:nvSpPr>
+        <p:spPr>
+          <a:xfrm>
+            <a:off x="202897" y="4646163"/>
+            <a:ext cx="5941050" cy="830997"/>
+          </a:xfrm>
+          <a:prstGeom prst="rect">
+            <a:avLst/>
+          </a:prstGeom>
+          <a:noFill/>
+        </p:spPr>
+        <p:txBody>
+          <a:bodyPr wrap="none" rtlCol="0">
+            <a:spAutoFit/>
+          </a:bodyPr>
+          <a:lstStyle/>
+          <a:p>
+            <a:pPr algn="ctr"/>
+            <a:r>
+              <a:rPr lang="en-IE" sz="4800" b="1" dirty="0">
+                <a:solidFill>
+                  <a:srgbClr val="FF7345"/>
+                </a:solidFill>
+                <a:latin typeface="Overlock" panose="02000506030000020004" pitchFamily="2" charset="0"/>
+              </a:rPr>
+              <a:t>Sunday, April 14, 2019</a:t>
+            </a:r>
+          </a:p>
+        </p:txBody>
+      </p:sp>
+    </p:spTree>
+    <p:extLst>
+      <p:ext uri="{BB962C8B-B14F-4D97-AF65-F5344CB8AC3E}">
+        <p14:creationId xmlns:p14="http://schemas.microsoft.com/office/powerpoint/2010/main" val="3190064582"/>
+      </p:ext>
+    </p:extLst>
+  </p:cSld>
+  <p:clrMapOvr>
+    <a:masterClrMapping/>
+  </p:clrMapOvr>
+</p:sld>
+</file>
+
+<file path=ppt/slides/slide4.xml><?xml version="1.0" encoding="utf-8"?>
+<p:sld xmlns:a="http://schemas.openxmlformats.org/drawingml/2006/main" xmlns:r="http://schemas.openxmlformats.org/officeDocument/2006/relationships" xmlns:p="http://schemas.openxmlformats.org/presentationml/2006/main">
+  <p:cSld>
+    <p:spTree>
+      <p:nvGrpSpPr>
+        <p:cNvPr id="1" name=""/>
+        <p:cNvGrpSpPr/>
+        <p:nvPr/>
+      </p:nvGrpSpPr>
+      <p:grpSpPr>
+        <a:xfrm>
+          <a:off x="0" y="0"/>
+          <a:ext cx="0" cy="0"/>
+          <a:chOff x="0" y="0"/>
+          <a:chExt cx="0" cy="0"/>
+        </a:xfrm>
+      </p:grpSpPr>
+      <p:pic>
+        <p:nvPicPr>
+          <p:cNvPr id="5" name="Picture 4">
+            <a:extLst>
+              <a:ext uri="{FF2B5EF4-FFF2-40B4-BE49-F238E27FC236}">
+                <a16:creationId xmlns:a16="http://schemas.microsoft.com/office/drawing/2014/main" id="{A173DC9F-C673-4C8E-89CC-9629B2861D74}"/>
+              </a:ext>
+            </a:extLst>
+          </p:cNvPr>
+          <p:cNvPicPr>
+            <a:picLocks noChangeAspect="1"/>
+          </p:cNvPicPr>
+          <p:nvPr/>
+        </p:nvPicPr>
+        <p:blipFill>
+          <a:blip r:embed="rId2">
+            <a:extLst>
+              <a:ext uri="{28A0092B-C50C-407E-A947-70E740481C1C}">
+                <a14:useLocalDpi xmlns:a14="http://schemas.microsoft.com/office/drawing/2010/main" val="0"/>
+              </a:ext>
+            </a:extLst>
+          </a:blip>
+          <a:stretch>
+            <a:fillRect/>
+          </a:stretch>
+        </p:blipFill>
+        <p:spPr>
+          <a:xfrm>
+            <a:off x="-246915" y="0"/>
+            <a:ext cx="5830645" cy="1943548"/>
+          </a:xfrm>
+          <a:prstGeom prst="rect">
+            <a:avLst/>
+          </a:prstGeom>
+        </p:spPr>
+      </p:pic>
+      <p:cxnSp>
+        <p:nvCxnSpPr>
+          <p:cNvPr id="6" name="Straight Connector 5">
+            <a:extLst>
+              <a:ext uri="{FF2B5EF4-FFF2-40B4-BE49-F238E27FC236}">
+                <a16:creationId xmlns:a16="http://schemas.microsoft.com/office/drawing/2014/main" id="{7E373742-6093-481A-9C58-650115813F0F}"/>
+              </a:ext>
+            </a:extLst>
+          </p:cNvPr>
+          <p:cNvCxnSpPr>
+            <a:cxnSpLocks/>
+          </p:cNvCxnSpPr>
+          <p:nvPr/>
+        </p:nvCxnSpPr>
+        <p:spPr>
+          <a:xfrm flipH="1">
+            <a:off x="326804" y="2025768"/>
+            <a:ext cx="4683206" cy="0"/>
+          </a:xfrm>
+          <a:prstGeom prst="line">
+            <a:avLst/>
+          </a:prstGeom>
+          <a:ln w="28575">
+            <a:solidFill>
+              <a:srgbClr val="758A35"/>
+            </a:solidFill>
+          </a:ln>
+        </p:spPr>
+        <p:style>
+          <a:lnRef idx="1">
+            <a:schemeClr val="accent1"/>
+          </a:lnRef>
+          <a:fillRef idx="0">
+            <a:schemeClr val="accent1"/>
+          </a:fillRef>
+          <a:effectRef idx="0">
+            <a:schemeClr val="accent1"/>
+          </a:effectRef>
+          <a:fontRef idx="minor">
+            <a:schemeClr val="tx1"/>
+          </a:fontRef>
+        </p:style>
+      </p:cxnSp>
+      <p:sp>
+        <p:nvSpPr>
           <p:cNvPr id="7" name="TextBox 6">
             <a:extLst>
               <a:ext uri="{FF2B5EF4-FFF2-40B4-BE49-F238E27FC236}">
@@ -4192,6 +4543,231 @@
         <p:spPr>
           <a:xfrm flipH="1">
             <a:off x="326804" y="4425676"/>
+            <a:ext cx="4683206" cy="0"/>
+          </a:xfrm>
+          <a:prstGeom prst="line">
+            <a:avLst/>
+          </a:prstGeom>
+          <a:ln w="28575">
+            <a:solidFill>
+              <a:srgbClr val="758A35"/>
+            </a:solidFill>
+          </a:ln>
+        </p:spPr>
+        <p:style>
+          <a:lnRef idx="1">
+            <a:schemeClr val="accent1"/>
+          </a:lnRef>
+          <a:fillRef idx="0">
+            <a:schemeClr val="accent1"/>
+          </a:fillRef>
+          <a:effectRef idx="0">
+            <a:schemeClr val="accent1"/>
+          </a:effectRef>
+          <a:fontRef idx="minor">
+            <a:schemeClr val="tx1"/>
+          </a:fontRef>
+        </p:style>
+      </p:cxnSp>
+      <p:pic>
+        <p:nvPicPr>
+          <p:cNvPr id="8" name="Picture 7">
+            <a:extLst>
+              <a:ext uri="{FF2B5EF4-FFF2-40B4-BE49-F238E27FC236}">
+                <a16:creationId xmlns:a16="http://schemas.microsoft.com/office/drawing/2014/main" id="{E5655C71-C9AD-4FF6-8505-CF64CD6A07CE}"/>
+              </a:ext>
+            </a:extLst>
+          </p:cNvPr>
+          <p:cNvPicPr>
+            <a:picLocks noChangeAspect="1"/>
+          </p:cNvPicPr>
+          <p:nvPr/>
+        </p:nvPicPr>
+        <p:blipFill>
+          <a:blip r:embed="rId2">
+            <a:extLst>
+              <a:ext uri="{28A0092B-C50C-407E-A947-70E740481C1C}">
+                <a14:useLocalDpi xmlns:a14="http://schemas.microsoft.com/office/drawing/2010/main" val="0"/>
+              </a:ext>
+            </a:extLst>
+          </a:blip>
+          <a:stretch>
+            <a:fillRect/>
+          </a:stretch>
+        </p:blipFill>
+        <p:spPr>
+          <a:xfrm>
+            <a:off x="6392638" y="-107830"/>
+            <a:ext cx="5830645" cy="1943548"/>
+          </a:xfrm>
+          <a:prstGeom prst="rect">
+            <a:avLst/>
+          </a:prstGeom>
+        </p:spPr>
+      </p:pic>
+      <p:cxnSp>
+        <p:nvCxnSpPr>
+          <p:cNvPr id="9" name="Straight Connector 8">
+            <a:extLst>
+              <a:ext uri="{FF2B5EF4-FFF2-40B4-BE49-F238E27FC236}">
+                <a16:creationId xmlns:a16="http://schemas.microsoft.com/office/drawing/2014/main" id="{07505353-4B61-4AF8-A4FE-5A3413A5B871}"/>
+              </a:ext>
+            </a:extLst>
+          </p:cNvPr>
+          <p:cNvCxnSpPr>
+            <a:cxnSpLocks/>
+          </p:cNvCxnSpPr>
+          <p:nvPr/>
+        </p:nvCxnSpPr>
+        <p:spPr>
+          <a:xfrm flipH="1">
+            <a:off x="6966357" y="1917938"/>
+            <a:ext cx="4683206" cy="0"/>
+          </a:xfrm>
+          <a:prstGeom prst="line">
+            <a:avLst/>
+          </a:prstGeom>
+          <a:ln w="28575">
+            <a:solidFill>
+              <a:srgbClr val="758A35"/>
+            </a:solidFill>
+          </a:ln>
+        </p:spPr>
+        <p:style>
+          <a:lnRef idx="1">
+            <a:schemeClr val="accent1"/>
+          </a:lnRef>
+          <a:fillRef idx="0">
+            <a:schemeClr val="accent1"/>
+          </a:fillRef>
+          <a:effectRef idx="0">
+            <a:schemeClr val="accent1"/>
+          </a:effectRef>
+          <a:fontRef idx="minor">
+            <a:schemeClr val="tx1"/>
+          </a:fontRef>
+        </p:style>
+      </p:cxnSp>
+      <p:sp>
+        <p:nvSpPr>
+          <p:cNvPr id="12" name="TextBox 11">
+            <a:extLst>
+              <a:ext uri="{FF2B5EF4-FFF2-40B4-BE49-F238E27FC236}">
+                <a16:creationId xmlns:a16="http://schemas.microsoft.com/office/drawing/2014/main" id="{CC0B21E1-4834-4973-9416-58FD06944B45}"/>
+              </a:ext>
+            </a:extLst>
+          </p:cNvPr>
+          <p:cNvSpPr txBox="1"/>
+          <p:nvPr/>
+        </p:nvSpPr>
+        <p:spPr>
+          <a:xfrm>
+            <a:off x="7224201" y="2502181"/>
+            <a:ext cx="3829895" cy="1569660"/>
+          </a:xfrm>
+          <a:prstGeom prst="rect">
+            <a:avLst/>
+          </a:prstGeom>
+          <a:noFill/>
+        </p:spPr>
+        <p:txBody>
+          <a:bodyPr wrap="none" rtlCol="0">
+            <a:spAutoFit/>
+          </a:bodyPr>
+          <a:lstStyle/>
+          <a:p>
+            <a:pPr algn="ctr"/>
+            <a:r>
+              <a:rPr lang="en-IE" sz="9600" b="1" dirty="0">
+                <a:solidFill>
+                  <a:srgbClr val="758A35"/>
+                </a:solidFill>
+                <a:latin typeface="Overlock" panose="02000506030000020004" pitchFamily="2" charset="0"/>
+              </a:rPr>
+              <a:t>Carlow</a:t>
+            </a:r>
+          </a:p>
+        </p:txBody>
+      </p:sp>
+      <p:sp>
+        <p:nvSpPr>
+          <p:cNvPr id="13" name="TextBox 12">
+            <a:extLst>
+              <a:ext uri="{FF2B5EF4-FFF2-40B4-BE49-F238E27FC236}">
+                <a16:creationId xmlns:a16="http://schemas.microsoft.com/office/drawing/2014/main" id="{5D87EF19-EA34-4D01-ABC0-CB9AE194CFCA}"/>
+              </a:ext>
+            </a:extLst>
+          </p:cNvPr>
+          <p:cNvSpPr txBox="1"/>
+          <p:nvPr/>
+        </p:nvSpPr>
+        <p:spPr>
+          <a:xfrm>
+            <a:off x="7063596" y="4257180"/>
+            <a:ext cx="4488729" cy="2492990"/>
+          </a:xfrm>
+          <a:prstGeom prst="rect">
+            <a:avLst/>
+          </a:prstGeom>
+          <a:noFill/>
+        </p:spPr>
+        <p:txBody>
+          <a:bodyPr wrap="none" rtlCol="0">
+            <a:spAutoFit/>
+          </a:bodyPr>
+          <a:lstStyle/>
+          <a:p>
+            <a:pPr algn="ctr"/>
+            <a:r>
+              <a:rPr lang="en-IE" sz="9600" b="1" dirty="0">
+                <a:solidFill>
+                  <a:srgbClr val="FF7345"/>
+                </a:solidFill>
+                <a:latin typeface="Overlock" panose="02000506030000020004" pitchFamily="2" charset="0"/>
+              </a:rPr>
+              <a:t>Sunday,</a:t>
+            </a:r>
+            <a:r>
+              <a:rPr lang="en-IE" sz="6000" b="1" dirty="0">
+                <a:solidFill>
+                  <a:srgbClr val="FF7345"/>
+                </a:solidFill>
+                <a:latin typeface="Overlock" panose="02000506030000020004" pitchFamily="2" charset="0"/>
+              </a:rPr>
+              <a:t> </a:t>
+            </a:r>
+          </a:p>
+          <a:p>
+            <a:pPr algn="ctr"/>
+            <a:r>
+              <a:rPr lang="en-IE" sz="6000" b="1" dirty="0">
+                <a:solidFill>
+                  <a:srgbClr val="FF7345"/>
+                </a:solidFill>
+                <a:latin typeface="Overlock" panose="02000506030000020004" pitchFamily="2" charset="0"/>
+              </a:rPr>
+              <a:t>April 14 2019</a:t>
+            </a:r>
+          </a:p>
+        </p:txBody>
+      </p:sp>
+      <p:cxnSp>
+        <p:nvCxnSpPr>
+          <p:cNvPr id="14" name="Straight Connector 13">
+            <a:extLst>
+              <a:ext uri="{FF2B5EF4-FFF2-40B4-BE49-F238E27FC236}">
+                <a16:creationId xmlns:a16="http://schemas.microsoft.com/office/drawing/2014/main" id="{A9616574-8B9A-432F-BBD8-1BABF6C6FBAD}"/>
+              </a:ext>
+            </a:extLst>
+          </p:cNvPr>
+          <p:cNvCxnSpPr>
+            <a:cxnSpLocks/>
+          </p:cNvCxnSpPr>
+          <p:nvPr/>
+        </p:nvCxnSpPr>
+        <p:spPr>
+          <a:xfrm flipH="1">
+            <a:off x="6966357" y="4317846"/>
             <a:ext cx="4683206" cy="0"/>
           </a:xfrm>
           <a:prstGeom prst="line">

</xml_diff>